<commit_message>
Saving previous version before modifying it
</commit_message>
<xml_diff>
--- a/old/Figures/figExo.pptx
+++ b/old/Figures/figExo.pptx
@@ -207,7 +207,7 @@
           <a:p>
             <a:fld id="{F7247873-13DB-B348-9DB5-F2E305A983EF}" type="datetimeFigureOut">
               <a:rPr lang="en-US" smtClean="0"/>
-              <a:t>6/24/17</a:t>
+              <a:t>6/26/17</a:t>
             </a:fld>
             <a:endParaRPr lang="en-US"/>
           </a:p>
@@ -606,7 +606,7 @@
           <a:p>
             <a:fld id="{EEE4A0AB-0E9A-E048-9EAB-8034B376575F}" type="datetimeFigureOut">
               <a:rPr lang="en-US" smtClean="0"/>
-              <a:t>6/24/17</a:t>
+              <a:t>6/26/17</a:t>
             </a:fld>
             <a:endParaRPr lang="en-US"/>
           </a:p>
@@ -776,7 +776,7 @@
           <a:p>
             <a:fld id="{EEE4A0AB-0E9A-E048-9EAB-8034B376575F}" type="datetimeFigureOut">
               <a:rPr lang="en-US" smtClean="0"/>
-              <a:t>6/24/17</a:t>
+              <a:t>6/26/17</a:t>
             </a:fld>
             <a:endParaRPr lang="en-US"/>
           </a:p>
@@ -956,7 +956,7 @@
           <a:p>
             <a:fld id="{EEE4A0AB-0E9A-E048-9EAB-8034B376575F}" type="datetimeFigureOut">
               <a:rPr lang="en-US" smtClean="0"/>
-              <a:t>6/24/17</a:t>
+              <a:t>6/26/17</a:t>
             </a:fld>
             <a:endParaRPr lang="en-US"/>
           </a:p>
@@ -1126,7 +1126,7 @@
           <a:p>
             <a:fld id="{EEE4A0AB-0E9A-E048-9EAB-8034B376575F}" type="datetimeFigureOut">
               <a:rPr lang="en-US" smtClean="0"/>
-              <a:t>6/24/17</a:t>
+              <a:t>6/26/17</a:t>
             </a:fld>
             <a:endParaRPr lang="en-US"/>
           </a:p>
@@ -1372,7 +1372,7 @@
           <a:p>
             <a:fld id="{EEE4A0AB-0E9A-E048-9EAB-8034B376575F}" type="datetimeFigureOut">
               <a:rPr lang="en-US" smtClean="0"/>
-              <a:t>6/24/17</a:t>
+              <a:t>6/26/17</a:t>
             </a:fld>
             <a:endParaRPr lang="en-US"/>
           </a:p>
@@ -1604,7 +1604,7 @@
           <a:p>
             <a:fld id="{EEE4A0AB-0E9A-E048-9EAB-8034B376575F}" type="datetimeFigureOut">
               <a:rPr lang="en-US" smtClean="0"/>
-              <a:t>6/24/17</a:t>
+              <a:t>6/26/17</a:t>
             </a:fld>
             <a:endParaRPr lang="en-US"/>
           </a:p>
@@ -1971,7 +1971,7 @@
           <a:p>
             <a:fld id="{EEE4A0AB-0E9A-E048-9EAB-8034B376575F}" type="datetimeFigureOut">
               <a:rPr lang="en-US" smtClean="0"/>
-              <a:t>6/24/17</a:t>
+              <a:t>6/26/17</a:t>
             </a:fld>
             <a:endParaRPr lang="en-US"/>
           </a:p>
@@ -2089,7 +2089,7 @@
           <a:p>
             <a:fld id="{EEE4A0AB-0E9A-E048-9EAB-8034B376575F}" type="datetimeFigureOut">
               <a:rPr lang="en-US" smtClean="0"/>
-              <a:t>6/24/17</a:t>
+              <a:t>6/26/17</a:t>
             </a:fld>
             <a:endParaRPr lang="en-US"/>
           </a:p>
@@ -2184,7 +2184,7 @@
           <a:p>
             <a:fld id="{EEE4A0AB-0E9A-E048-9EAB-8034B376575F}" type="datetimeFigureOut">
               <a:rPr lang="en-US" smtClean="0"/>
-              <a:t>6/24/17</a:t>
+              <a:t>6/26/17</a:t>
             </a:fld>
             <a:endParaRPr lang="en-US"/>
           </a:p>
@@ -2461,7 +2461,7 @@
           <a:p>
             <a:fld id="{EEE4A0AB-0E9A-E048-9EAB-8034B376575F}" type="datetimeFigureOut">
               <a:rPr lang="en-US" smtClean="0"/>
-              <a:t>6/24/17</a:t>
+              <a:t>6/26/17</a:t>
             </a:fld>
             <a:endParaRPr lang="en-US"/>
           </a:p>
@@ -2714,7 +2714,7 @@
           <a:p>
             <a:fld id="{EEE4A0AB-0E9A-E048-9EAB-8034B376575F}" type="datetimeFigureOut">
               <a:rPr lang="en-US" smtClean="0"/>
-              <a:t>6/24/17</a:t>
+              <a:t>6/26/17</a:t>
             </a:fld>
             <a:endParaRPr lang="en-US"/>
           </a:p>
@@ -2927,7 +2927,7 @@
           <a:p>
             <a:fld id="{EEE4A0AB-0E9A-E048-9EAB-8034B376575F}" type="datetimeFigureOut">
               <a:rPr lang="en-US" smtClean="0"/>
-              <a:t>6/24/17</a:t>
+              <a:t>6/26/17</a:t>
             </a:fld>
             <a:endParaRPr lang="en-US"/>
           </a:p>
@@ -4570,8 +4570,9 @@
             <a:avLst/>
           </a:prstGeom>
           <a:solidFill>
-            <a:schemeClr val="bg1">
-              <a:lumMod val="85000"/>
+            <a:schemeClr val="tx1">
+              <a:lumMod val="50000"/>
+              <a:lumOff val="50000"/>
             </a:schemeClr>
           </a:solidFill>
           <a:ln>
@@ -4836,8 +4837,9 @@
             <a:avLst/>
           </a:prstGeom>
           <a:solidFill>
-            <a:schemeClr val="bg1">
-              <a:lumMod val="85000"/>
+            <a:schemeClr val="tx1">
+              <a:lumMod val="50000"/>
+              <a:lumOff val="50000"/>
             </a:schemeClr>
           </a:solidFill>
           <a:ln>
@@ -5235,8 +5237,9 @@
             <a:avLst/>
           </a:prstGeom>
           <a:solidFill>
-            <a:schemeClr val="bg1">
-              <a:lumMod val="65000"/>
+            <a:schemeClr val="tx1">
+              <a:lumMod val="50000"/>
+              <a:lumOff val="50000"/>
             </a:schemeClr>
           </a:solidFill>
           <a:ln>
@@ -5297,8 +5300,9 @@
             <a:avLst/>
           </a:prstGeom>
           <a:solidFill>
-            <a:schemeClr val="bg1">
-              <a:lumMod val="65000"/>
+            <a:schemeClr val="tx1">
+              <a:lumMod val="50000"/>
+              <a:lumOff val="50000"/>
             </a:schemeClr>
           </a:solidFill>
           <a:ln>
@@ -5412,7 +5416,7 @@
         </p:nvSpPr>
         <p:spPr>
           <a:xfrm>
-            <a:off x="1051133" y="2256090"/>
+            <a:off x="1051132" y="2256087"/>
             <a:ext cx="3418317" cy="2461188"/>
           </a:xfrm>
           <a:prstGeom prst="rect">
@@ -5712,7 +5716,7 @@
             <a:avLst/>
           </a:prstGeom>
           <a:solidFill>
-            <a:schemeClr val="accent5">
+            <a:schemeClr val="tx2">
               <a:lumMod val="60000"/>
               <a:lumOff val="40000"/>
             </a:schemeClr>
@@ -5767,7 +5771,7 @@
             <a:avLst/>
           </a:prstGeom>
           <a:solidFill>
-            <a:schemeClr val="accent5">
+            <a:schemeClr val="tx2">
               <a:lumMod val="60000"/>
               <a:lumOff val="40000"/>
             </a:schemeClr>
@@ -5822,7 +5826,7 @@
             <a:avLst/>
           </a:prstGeom>
           <a:solidFill>
-            <a:schemeClr val="accent5">
+            <a:schemeClr val="tx2">
               <a:lumMod val="60000"/>
               <a:lumOff val="40000"/>
             </a:schemeClr>
@@ -5873,7 +5877,7 @@
             <a:avLst/>
           </a:prstGeom>
           <a:solidFill>
-            <a:schemeClr val="accent5">
+            <a:schemeClr val="tx2">
               <a:lumMod val="60000"/>
               <a:lumOff val="40000"/>
             </a:schemeClr>
@@ -5959,7 +5963,12 @@
           <a:prstGeom prst="rect">
             <a:avLst/>
           </a:prstGeom>
-          <a:noFill/>
+          <a:solidFill>
+            <a:schemeClr val="tx2">
+              <a:lumMod val="60000"/>
+              <a:lumOff val="40000"/>
+            </a:schemeClr>
+          </a:solidFill>
         </p:spPr>
         <p:txBody>
           <a:bodyPr wrap="none" rtlCol="0">
@@ -6517,8 +6526,9 @@
             <a:avLst/>
           </a:prstGeom>
           <a:solidFill>
-            <a:schemeClr val="bg1">
-              <a:lumMod val="65000"/>
+            <a:schemeClr val="tx1">
+              <a:lumMod val="50000"/>
+              <a:lumOff val="50000"/>
             </a:schemeClr>
           </a:solidFill>
           <a:ln>
@@ -6566,36 +6576,6 @@
       </p:sp>
       <p:sp>
         <p:nvSpPr>
-          <p:cNvPr id="5" name="TextBox 4"/>
-          <p:cNvSpPr txBox="1"/>
-          <p:nvPr/>
-        </p:nvSpPr>
-        <p:spPr>
-          <a:xfrm>
-            <a:off x="1887007" y="5845324"/>
-            <a:ext cx="1513556" cy="369332"/>
-          </a:xfrm>
-          <a:prstGeom prst="rect">
-            <a:avLst/>
-          </a:prstGeom>
-          <a:noFill/>
-        </p:spPr>
-        <p:txBody>
-          <a:bodyPr wrap="none" rtlCol="0">
-            <a:spAutoFit/>
-          </a:bodyPr>
-          <a:lstStyle/>
-          <a:p>
-            <a:r>
-              <a:rPr lang="en-US" dirty="0" smtClean="0"/>
-              <a:t>Monolithic OS</a:t>
-            </a:r>
-            <a:endParaRPr lang="en-US" dirty="0"/>
-          </a:p>
-        </p:txBody>
-      </p:sp>
-      <p:sp>
-        <p:nvSpPr>
           <p:cNvPr id="6" name="Rectangle 5"/>
           <p:cNvSpPr/>
           <p:nvPr/>
@@ -6725,7 +6705,7 @@
             <a:avLst/>
           </a:prstGeom>
           <a:solidFill>
-            <a:schemeClr val="accent5">
+            <a:schemeClr val="tx2">
               <a:lumMod val="60000"/>
               <a:lumOff val="40000"/>
             </a:schemeClr>
@@ -6780,7 +6760,7 @@
             <a:avLst/>
           </a:prstGeom>
           <a:solidFill>
-            <a:schemeClr val="accent5">
+            <a:schemeClr val="tx2">
               <a:lumMod val="60000"/>
               <a:lumOff val="40000"/>
             </a:schemeClr>
@@ -6835,8 +6815,9 @@
             <a:avLst/>
           </a:prstGeom>
           <a:solidFill>
-            <a:schemeClr val="bg1">
-              <a:lumMod val="65000"/>
+            <a:schemeClr val="tx1">
+              <a:lumMod val="50000"/>
+              <a:lumOff val="50000"/>
             </a:schemeClr>
           </a:solidFill>
           <a:ln>
@@ -6884,36 +6865,6 @@
       </p:sp>
       <p:sp>
         <p:nvSpPr>
-          <p:cNvPr id="28" name="TextBox 27"/>
-          <p:cNvSpPr txBox="1"/>
-          <p:nvPr/>
-        </p:nvSpPr>
-        <p:spPr>
-          <a:xfrm>
-            <a:off x="7586767" y="5845324"/>
-            <a:ext cx="1513556" cy="369332"/>
-          </a:xfrm>
-          <a:prstGeom prst="rect">
-            <a:avLst/>
-          </a:prstGeom>
-          <a:noFill/>
-        </p:spPr>
-        <p:txBody>
-          <a:bodyPr wrap="none" rtlCol="0">
-            <a:spAutoFit/>
-          </a:bodyPr>
-          <a:lstStyle/>
-          <a:p>
-            <a:r>
-              <a:rPr lang="en-US" dirty="0" smtClean="0"/>
-              <a:t>Monolithic OS</a:t>
-            </a:r>
-            <a:endParaRPr lang="en-US" dirty="0"/>
-          </a:p>
-        </p:txBody>
-      </p:sp>
-      <p:sp>
-        <p:nvSpPr>
           <p:cNvPr id="29" name="Rectangle 28"/>
           <p:cNvSpPr/>
           <p:nvPr/>
@@ -7141,7 +7092,7 @@
             <a:avLst/>
           </a:prstGeom>
           <a:solidFill>
-            <a:schemeClr val="accent5">
+            <a:schemeClr val="tx2">
               <a:lumMod val="60000"/>
               <a:lumOff val="40000"/>
             </a:schemeClr>
@@ -7196,7 +7147,7 @@
             <a:avLst/>
           </a:prstGeom>
           <a:solidFill>
-            <a:schemeClr val="accent5">
+            <a:schemeClr val="tx2">
               <a:lumMod val="60000"/>
               <a:lumOff val="40000"/>
             </a:schemeClr>
@@ -7385,8 +7336,9 @@
             <a:avLst/>
           </a:prstGeom>
           <a:solidFill>
-            <a:schemeClr val="bg1">
-              <a:lumMod val="65000"/>
+            <a:schemeClr val="tx1">
+              <a:lumMod val="50000"/>
+              <a:lumOff val="50000"/>
             </a:schemeClr>
           </a:solidFill>
           <a:ln>
@@ -7447,8 +7399,9 @@
             <a:avLst/>
           </a:prstGeom>
           <a:solidFill>
-            <a:schemeClr val="bg1">
-              <a:lumMod val="65000"/>
+            <a:schemeClr val="tx1">
+              <a:lumMod val="50000"/>
+              <a:lumOff val="50000"/>
             </a:schemeClr>
           </a:solidFill>
           <a:ln>
@@ -8189,66 +8142,6 @@
               <a:rPr lang="en-US" dirty="0" smtClean="0"/>
               <a:t>Database library</a:t>
             </a:r>
-          </a:p>
-        </p:txBody>
-      </p:sp>
-      <p:sp>
-        <p:nvSpPr>
-          <p:cNvPr id="27" name="TextBox 26"/>
-          <p:cNvSpPr txBox="1"/>
-          <p:nvPr/>
-        </p:nvSpPr>
-        <p:spPr>
-          <a:xfrm>
-            <a:off x="1642775" y="5713243"/>
-            <a:ext cx="2214709" cy="369332"/>
-          </a:xfrm>
-          <a:prstGeom prst="rect">
-            <a:avLst/>
-          </a:prstGeom>
-          <a:noFill/>
-        </p:spPr>
-        <p:txBody>
-          <a:bodyPr wrap="none" rtlCol="0">
-            <a:spAutoFit/>
-          </a:bodyPr>
-          <a:lstStyle/>
-          <a:p>
-            <a:r>
-              <a:rPr lang="en-US" smtClean="0"/>
-              <a:t>Standard deployment</a:t>
-            </a:r>
-            <a:endParaRPr lang="en-US" dirty="0"/>
-          </a:p>
-        </p:txBody>
-      </p:sp>
-      <p:sp>
-        <p:nvSpPr>
-          <p:cNvPr id="28" name="TextBox 27"/>
-          <p:cNvSpPr txBox="1"/>
-          <p:nvPr/>
-        </p:nvSpPr>
-        <p:spPr>
-          <a:xfrm>
-            <a:off x="7580068" y="5713243"/>
-            <a:ext cx="1089401" cy="369332"/>
-          </a:xfrm>
-          <a:prstGeom prst="rect">
-            <a:avLst/>
-          </a:prstGeom>
-          <a:noFill/>
-        </p:spPr>
-        <p:txBody>
-          <a:bodyPr wrap="none" rtlCol="0">
-            <a:spAutoFit/>
-          </a:bodyPr>
-          <a:lstStyle/>
-          <a:p>
-            <a:r>
-              <a:rPr lang="en-US" smtClean="0"/>
-              <a:t>Unikernel</a:t>
-            </a:r>
-            <a:endParaRPr lang="en-US" dirty="0"/>
           </a:p>
         </p:txBody>
       </p:sp>
@@ -8297,8 +8190,9 @@
             <a:avLst/>
           </a:prstGeom>
           <a:solidFill>
-            <a:schemeClr val="bg1">
-              <a:lumMod val="65000"/>
+            <a:schemeClr val="tx1">
+              <a:lumMod val="50000"/>
+              <a:lumOff val="50000"/>
             </a:schemeClr>
           </a:solidFill>
           <a:ln>
@@ -8421,8 +8315,9 @@
             <a:avLst/>
           </a:prstGeom>
           <a:solidFill>
-            <a:schemeClr val="bg1">
-              <a:lumMod val="65000"/>
+            <a:schemeClr val="tx1">
+              <a:lumMod val="50000"/>
+              <a:lumOff val="50000"/>
             </a:schemeClr>
           </a:solidFill>
           <a:ln>
@@ -8653,7 +8548,7 @@
             <a:avLst/>
           </a:prstGeom>
           <a:solidFill>
-            <a:schemeClr val="accent5">
+            <a:schemeClr val="tx2">
               <a:lumMod val="60000"/>
               <a:lumOff val="40000"/>
             </a:schemeClr>
@@ -8708,7 +8603,7 @@
             <a:avLst/>
           </a:prstGeom>
           <a:solidFill>
-            <a:schemeClr val="accent5">
+            <a:schemeClr val="tx2">
               <a:lumMod val="60000"/>
               <a:lumOff val="40000"/>
             </a:schemeClr>
@@ -8798,70 +8693,6 @@
             <a:r>
               <a:rPr lang="en-US" dirty="0" err="1" smtClean="0"/>
               <a:t>LibOS</a:t>
-            </a:r>
-            <a:endParaRPr lang="en-US" dirty="0"/>
-          </a:p>
-        </p:txBody>
-      </p:sp>
-      <p:sp>
-        <p:nvSpPr>
-          <p:cNvPr id="13" name="TextBox 12"/>
-          <p:cNvSpPr txBox="1"/>
-          <p:nvPr/>
-        </p:nvSpPr>
-        <p:spPr>
-          <a:xfrm>
-            <a:off x="2235886" y="5691501"/>
-            <a:ext cx="1028487" cy="369332"/>
-          </a:xfrm>
-          <a:prstGeom prst="rect">
-            <a:avLst/>
-          </a:prstGeom>
-          <a:noFill/>
-        </p:spPr>
-        <p:txBody>
-          <a:bodyPr wrap="none" rtlCol="0">
-            <a:spAutoFit/>
-          </a:bodyPr>
-          <a:lstStyle/>
-          <a:p>
-            <a:r>
-              <a:rPr lang="en-US" smtClean="0"/>
-              <a:t>Standard</a:t>
-            </a:r>
-            <a:endParaRPr lang="en-US" dirty="0"/>
-          </a:p>
-        </p:txBody>
-      </p:sp>
-      <p:sp>
-        <p:nvSpPr>
-          <p:cNvPr id="14" name="TextBox 13"/>
-          <p:cNvSpPr txBox="1"/>
-          <p:nvPr/>
-        </p:nvSpPr>
-        <p:spPr>
-          <a:xfrm>
-            <a:off x="7279964" y="5691501"/>
-            <a:ext cx="775212" cy="369332"/>
-          </a:xfrm>
-          <a:prstGeom prst="rect">
-            <a:avLst/>
-          </a:prstGeom>
-          <a:noFill/>
-        </p:spPr>
-        <p:txBody>
-          <a:bodyPr wrap="none" rtlCol="0">
-            <a:spAutoFit/>
-          </a:bodyPr>
-          <a:lstStyle/>
-          <a:p>
-            <a:r>
-              <a:rPr lang="en-US"/>
-              <a:t>H</a:t>
-            </a:r>
-            <a:r>
-              <a:rPr lang="en-US" smtClean="0"/>
-              <a:t>aven</a:t>
             </a:r>
             <a:endParaRPr lang="en-US" dirty="0"/>
           </a:p>
@@ -9443,15 +9274,16 @@
         </p:nvSpPr>
         <p:spPr>
           <a:xfrm>
-            <a:off x="4201160" y="426720"/>
+            <a:off x="4201160" y="436880"/>
             <a:ext cx="1859280" cy="1524000"/>
           </a:xfrm>
           <a:prstGeom prst="ellipse">
             <a:avLst/>
           </a:prstGeom>
           <a:solidFill>
-            <a:schemeClr val="bg1">
-              <a:lumMod val="85000"/>
+            <a:schemeClr val="tx1">
+              <a:lumMod val="50000"/>
+              <a:lumOff val="50000"/>
             </a:schemeClr>
           </a:solidFill>
           <a:ln>
@@ -9606,8 +9438,8 @@
         </p:nvCxnSpPr>
         <p:spPr>
           <a:xfrm flipV="1">
-            <a:off x="3271520" y="1727535"/>
-            <a:ext cx="1201925" cy="223185"/>
+            <a:off x="3271520" y="1737695"/>
+            <a:ext cx="1201925" cy="213025"/>
           </a:xfrm>
           <a:prstGeom prst="line">
             <a:avLst/>
@@ -9644,8 +9476,8 @@
         </p:nvCxnSpPr>
         <p:spPr>
           <a:xfrm>
-            <a:off x="5788155" y="1727535"/>
-            <a:ext cx="1265930" cy="223185"/>
+            <a:off x="5788155" y="1737695"/>
+            <a:ext cx="1265930" cy="213025"/>
           </a:xfrm>
           <a:prstGeom prst="line">
             <a:avLst/>
@@ -9716,8 +9548,9 @@
             <a:avLst/>
           </a:prstGeom>
           <a:solidFill>
-            <a:schemeClr val="bg1">
-              <a:lumMod val="85000"/>
+            <a:schemeClr val="tx1">
+              <a:lumMod val="50000"/>
+              <a:lumOff val="50000"/>
             </a:schemeClr>
           </a:solidFill>
           <a:ln>

</xml_diff>